<commit_message>
Added more slides to presentation and did final proof-read of dissertation
</commit_message>
<xml_diff>
--- a/presentation/presentation_slides.pptx
+++ b/presentation/presentation_slides.pptx
@@ -7,6 +7,7 @@
   <p:sldIdLst>
     <p:sldId id="256" r:id="rId2"/>
     <p:sldId id="257" r:id="rId3"/>
+    <p:sldId id="258" r:id="rId4"/>
   </p:sldIdLst>
   <p:sldSz cx="12192000" cy="6858000"/>
   <p:notesSz cx="6858000" cy="9144000"/>
@@ -105,6 +106,11 @@
       </a:defRPr>
     </a:lvl9pPr>
   </p:defaultTextStyle>
+  <p:extLst>
+    <p:ext uri="{EFAFB233-063F-42B5-8137-9DF3F51BA10A}">
+      <p15:sldGuideLst xmlns:p15="http://schemas.microsoft.com/office/powerpoint/2012/main"/>
+    </p:ext>
+  </p:extLst>
 </p:presentation>
 </file>
 
@@ -276,7 +282,7 @@
           <a:p>
             <a:fld id="{763604D9-471B-4D04-91EE-DF22DC530484}" type="datetimeFigureOut">
               <a:rPr lang="en-GB" smtClean="0"/>
-              <a:t>22/03/2023</a:t>
+              <a:t>23/03/2023</a:t>
             </a:fld>
             <a:endParaRPr lang="en-GB"/>
           </a:p>
@@ -504,7 +510,7 @@
           <a:p>
             <a:fld id="{763604D9-471B-4D04-91EE-DF22DC530484}" type="datetimeFigureOut">
               <a:rPr lang="en-GB" smtClean="0"/>
-              <a:t>22/03/2023</a:t>
+              <a:t>23/03/2023</a:t>
             </a:fld>
             <a:endParaRPr lang="en-GB"/>
           </a:p>
@@ -684,7 +690,7 @@
           <a:p>
             <a:fld id="{763604D9-471B-4D04-91EE-DF22DC530484}" type="datetimeFigureOut">
               <a:rPr lang="en-GB" smtClean="0"/>
-              <a:t>22/03/2023</a:t>
+              <a:t>23/03/2023</a:t>
             </a:fld>
             <a:endParaRPr lang="en-GB"/>
           </a:p>
@@ -854,7 +860,7 @@
           <a:p>
             <a:fld id="{763604D9-471B-4D04-91EE-DF22DC530484}" type="datetimeFigureOut">
               <a:rPr lang="en-GB" smtClean="0"/>
-              <a:t>22/03/2023</a:t>
+              <a:t>23/03/2023</a:t>
             </a:fld>
             <a:endParaRPr lang="en-GB"/>
           </a:p>
@@ -1108,7 +1114,7 @@
           <a:p>
             <a:fld id="{763604D9-471B-4D04-91EE-DF22DC530484}" type="datetimeFigureOut">
               <a:rPr lang="en-GB" smtClean="0"/>
-              <a:t>22/03/2023</a:t>
+              <a:t>23/03/2023</a:t>
             </a:fld>
             <a:endParaRPr lang="en-GB"/>
           </a:p>
@@ -1434,7 +1440,7 @@
           <a:p>
             <a:fld id="{763604D9-471B-4D04-91EE-DF22DC530484}" type="datetimeFigureOut">
               <a:rPr lang="en-GB" smtClean="0"/>
-              <a:t>22/03/2023</a:t>
+              <a:t>23/03/2023</a:t>
             </a:fld>
             <a:endParaRPr lang="en-GB"/>
           </a:p>
@@ -1885,7 +1891,7 @@
           <a:p>
             <a:fld id="{763604D9-471B-4D04-91EE-DF22DC530484}" type="datetimeFigureOut">
               <a:rPr lang="en-GB" smtClean="0"/>
-              <a:t>22/03/2023</a:t>
+              <a:t>23/03/2023</a:t>
             </a:fld>
             <a:endParaRPr lang="en-GB"/>
           </a:p>
@@ -2003,7 +2009,7 @@
           <a:p>
             <a:fld id="{763604D9-471B-4D04-91EE-DF22DC530484}" type="datetimeFigureOut">
               <a:rPr lang="en-GB" smtClean="0"/>
-              <a:t>22/03/2023</a:t>
+              <a:t>23/03/2023</a:t>
             </a:fld>
             <a:endParaRPr lang="en-GB"/>
           </a:p>
@@ -2098,7 +2104,7 @@
           <a:p>
             <a:fld id="{763604D9-471B-4D04-91EE-DF22DC530484}" type="datetimeFigureOut">
               <a:rPr lang="en-GB" smtClean="0"/>
-              <a:t>22/03/2023</a:t>
+              <a:t>23/03/2023</a:t>
             </a:fld>
             <a:endParaRPr lang="en-GB"/>
           </a:p>
@@ -2385,7 +2391,7 @@
           <a:p>
             <a:fld id="{763604D9-471B-4D04-91EE-DF22DC530484}" type="datetimeFigureOut">
               <a:rPr lang="en-GB" smtClean="0"/>
-              <a:t>22/03/2023</a:t>
+              <a:t>23/03/2023</a:t>
             </a:fld>
             <a:endParaRPr lang="en-GB"/>
           </a:p>
@@ -2707,7 +2713,7 @@
           <a:p>
             <a:fld id="{763604D9-471B-4D04-91EE-DF22DC530484}" type="datetimeFigureOut">
               <a:rPr lang="en-GB" smtClean="0"/>
-              <a:t>22/03/2023</a:t>
+              <a:t>23/03/2023</a:t>
             </a:fld>
             <a:endParaRPr lang="en-GB"/>
           </a:p>
@@ -2961,7 +2967,7 @@
           <a:p>
             <a:fld id="{763604D9-471B-4D04-91EE-DF22DC530484}" type="datetimeFigureOut">
               <a:rPr lang="en-GB" smtClean="0"/>
-              <a:t>22/03/2023</a:t>
+              <a:t>23/03/2023</a:t>
             </a:fld>
             <a:endParaRPr lang="en-GB"/>
           </a:p>
@@ -3564,18 +3570,146 @@
             <p:ph type="title"/>
           </p:nvPr>
         </p:nvSpPr>
-        <p:spPr/>
+        <p:spPr>
+          <a:xfrm>
+            <a:off x="985919" y="606828"/>
+            <a:ext cx="8480644" cy="718733"/>
+          </a:xfrm>
+        </p:spPr>
         <p:txBody>
           <a:bodyPr/>
           <a:lstStyle/>
           <a:p>
             <a:r>
               <a:rPr lang="en-GB" dirty="0"/>
-              <a:t>Hello</a:t>
-            </a:r>
-          </a:p>
-        </p:txBody>
-      </p:sp>
+              <a:t>Automatic Videography of Audio</a:t>
+            </a:r>
+          </a:p>
+        </p:txBody>
+      </p:sp>
+      <p:sp>
+        <p:nvSpPr>
+          <p:cNvPr id="4" name="TextBox 3">
+            <a:extLst>
+              <a:ext uri="{FF2B5EF4-FFF2-40B4-BE49-F238E27FC236}">
+                <a16:creationId xmlns:a16="http://schemas.microsoft.com/office/drawing/2014/main" id="{67B08A0E-0E54-9473-B6EA-3BD60D11F175}"/>
+              </a:ext>
+            </a:extLst>
+          </p:cNvPr>
+          <p:cNvSpPr txBox="1"/>
+          <p:nvPr/>
+        </p:nvSpPr>
+        <p:spPr>
+          <a:xfrm>
+            <a:off x="985920" y="3807727"/>
+            <a:ext cx="8595359" cy="2496581"/>
+          </a:xfrm>
+          <a:prstGeom prst="rect">
+            <a:avLst/>
+          </a:prstGeom>
+          <a:noFill/>
+        </p:spPr>
+        <p:txBody>
+          <a:bodyPr wrap="square" rtlCol="0">
+            <a:spAutoFit/>
+          </a:bodyPr>
+          <a:lstStyle/>
+          <a:p>
+            <a:r>
+              <a:rPr lang="en-GB" b="1" dirty="0"/>
+              <a:t>Motivations:</a:t>
+            </a:r>
+          </a:p>
+          <a:p>
+            <a:pPr marL="285750" indent="-285750">
+              <a:lnSpc>
+                <a:spcPct val="200000"/>
+              </a:lnSpc>
+              <a:buFont typeface="Arial" panose="020B0604020202020204" pitchFamily="34" charset="0"/>
+              <a:buChar char="•"/>
+            </a:pPr>
+            <a:r>
+              <a:rPr lang="en-GB" dirty="0"/>
+              <a:t>Popularity and rise of video production.</a:t>
+            </a:r>
+          </a:p>
+          <a:p>
+            <a:pPr marL="285750" indent="-285750">
+              <a:lnSpc>
+                <a:spcPct val="200000"/>
+              </a:lnSpc>
+              <a:buFont typeface="Arial" panose="020B0604020202020204" pitchFamily="34" charset="0"/>
+              <a:buChar char="•"/>
+            </a:pPr>
+            <a:r>
+              <a:rPr lang="en-GB" dirty="0"/>
+              <a:t>Music on video sharing platforms often lack any video content.</a:t>
+            </a:r>
+          </a:p>
+          <a:p>
+            <a:pPr marL="285750" indent="-285750">
+              <a:lnSpc>
+                <a:spcPct val="200000"/>
+              </a:lnSpc>
+              <a:buFont typeface="Arial" panose="020B0604020202020204" pitchFamily="34" charset="0"/>
+              <a:buChar char="•"/>
+            </a:pPr>
+            <a:r>
+              <a:rPr lang="en-GB" dirty="0"/>
+              <a:t>Multimodality of information can increase accessibility and user retention.</a:t>
+            </a:r>
+          </a:p>
+          <a:p>
+            <a:pPr marL="285750" indent="-285750">
+              <a:lnSpc>
+                <a:spcPct val="200000"/>
+              </a:lnSpc>
+              <a:buFont typeface="Arial" panose="020B0604020202020204" pitchFamily="34" charset="0"/>
+              <a:buChar char="•"/>
+            </a:pPr>
+            <a:r>
+              <a:rPr lang="en-GB" dirty="0"/>
+              <a:t>Enhance previous system made by Andrew Parker.</a:t>
+            </a:r>
+          </a:p>
+        </p:txBody>
+      </p:sp>
+      <p:pic>
+        <p:nvPicPr>
+          <p:cNvPr id="6" name="Picture 5" descr="Icon">
+            <a:extLst>
+              <a:ext uri="{FF2B5EF4-FFF2-40B4-BE49-F238E27FC236}">
+                <a16:creationId xmlns:a16="http://schemas.microsoft.com/office/drawing/2014/main" id="{56B7586B-AF42-A4FD-64B8-DA2367F095CA}"/>
+              </a:ext>
+            </a:extLst>
+          </p:cNvPr>
+          <p:cNvPicPr>
+            <a:picLocks noChangeAspect="1"/>
+          </p:cNvPicPr>
+          <p:nvPr/>
+        </p:nvPicPr>
+        <p:blipFill>
+          <a:blip r:embed="rId2">
+            <a:extLst>
+              <a:ext uri="{28A0092B-C50C-407E-A947-70E740481C1C}">
+                <a14:useLocalDpi xmlns:a14="http://schemas.microsoft.com/office/drawing/2010/main" val="0"/>
+              </a:ext>
+            </a:extLst>
+          </a:blip>
+          <a:stretch>
+            <a:fillRect/>
+          </a:stretch>
+        </p:blipFill>
+        <p:spPr>
+          <a:xfrm>
+            <a:off x="3393565" y="2311300"/>
+            <a:ext cx="4155623" cy="1553575"/>
+          </a:xfrm>
+          <a:prstGeom prst="rect">
+            <a:avLst/>
+          </a:prstGeom>
+        </p:spPr>
+      </p:pic>
       <p:sp>
         <p:nvSpPr>
           <p:cNvPr id="3" name="Content Placeholder 2">
@@ -3592,19 +3726,605 @@
             <p:ph idx="1"/>
           </p:nvPr>
         </p:nvSpPr>
-        <p:spPr/>
-        <p:txBody>
-          <a:bodyPr/>
-          <a:lstStyle/>
-          <a:p>
-            <a:endParaRPr lang="en-GB"/>
-          </a:p>
-        </p:txBody>
-      </p:sp>
+        <p:spPr>
+          <a:xfrm>
+            <a:off x="928561" y="1543051"/>
+            <a:ext cx="8595360" cy="947057"/>
+          </a:xfrm>
+        </p:spPr>
+        <p:txBody>
+          <a:bodyPr/>
+          <a:lstStyle/>
+          <a:p>
+            <a:pPr marL="0" indent="0">
+              <a:buNone/>
+            </a:pPr>
+            <a:endParaRPr lang="en-GB" sz="600" b="1" dirty="0">
+              <a:latin typeface="+mj-lt"/>
+            </a:endParaRPr>
+          </a:p>
+          <a:p>
+            <a:pPr marL="274320" lvl="1" indent="0" algn="ctr">
+              <a:buNone/>
+            </a:pPr>
+            <a:r>
+              <a:rPr lang="en-GB" dirty="0"/>
+              <a:t>	</a:t>
+            </a:r>
+            <a:r>
+              <a:rPr lang="en-GB" sz="2000" b="1" dirty="0">
+                <a:solidFill>
+                  <a:srgbClr val="00359E"/>
+                </a:solidFill>
+              </a:rPr>
+              <a:t>Tool that automatically generates illustrated videos from any audio source.</a:t>
+            </a:r>
+          </a:p>
+          <a:p>
+            <a:pPr marL="274320" lvl="1" indent="0" algn="ctr">
+              <a:buNone/>
+            </a:pPr>
+            <a:endParaRPr lang="en-GB" b="1" dirty="0">
+              <a:solidFill>
+                <a:srgbClr val="00359E"/>
+              </a:solidFill>
+            </a:endParaRPr>
+          </a:p>
+          <a:p>
+            <a:pPr marL="274320" lvl="1" indent="0">
+              <a:buNone/>
+            </a:pPr>
+            <a:endParaRPr lang="en-GB" b="1" dirty="0">
+              <a:solidFill>
+                <a:srgbClr val="00359E"/>
+              </a:solidFill>
+            </a:endParaRPr>
+          </a:p>
+        </p:txBody>
+      </p:sp>
+      <p:pic>
+        <p:nvPicPr>
+          <p:cNvPr id="1028" name="Picture 4" descr="The YouTube logo: a history | Creative Bloq">
+            <a:extLst>
+              <a:ext uri="{FF2B5EF4-FFF2-40B4-BE49-F238E27FC236}">
+                <a16:creationId xmlns:a16="http://schemas.microsoft.com/office/drawing/2014/main" id="{4A28EFED-FF2B-AE0E-277A-90816A3A3EE9}"/>
+              </a:ext>
+            </a:extLst>
+          </p:cNvPr>
+          <p:cNvPicPr>
+            <a:picLocks noChangeAspect="1" noChangeArrowheads="1"/>
+          </p:cNvPicPr>
+          <p:nvPr/>
+        </p:nvPicPr>
+        <p:blipFill>
+          <a:blip r:embed="rId3">
+            <a:extLst>
+              <a:ext uri="{28A0092B-C50C-407E-A947-70E740481C1C}">
+                <a14:useLocalDpi xmlns:a14="http://schemas.microsoft.com/office/drawing/2010/main" val="0"/>
+              </a:ext>
+            </a:extLst>
+          </a:blip>
+          <a:srcRect/>
+          <a:stretch>
+            <a:fillRect/>
+          </a:stretch>
+        </p:blipFill>
+        <p:spPr bwMode="auto">
+          <a:xfrm>
+            <a:off x="8661991" y="3949524"/>
+            <a:ext cx="2446118" cy="1373590"/>
+          </a:xfrm>
+          <a:prstGeom prst="rect">
+            <a:avLst/>
+          </a:prstGeom>
+          <a:noFill/>
+          <a:extLst>
+            <a:ext uri="{909E8E84-426E-40DD-AFC4-6F175D3DCCD1}">
+              <a14:hiddenFill xmlns:a14="http://schemas.microsoft.com/office/drawing/2010/main">
+                <a:solidFill>
+                  <a:srgbClr val="FFFFFF"/>
+                </a:solidFill>
+              </a14:hiddenFill>
+            </a:ext>
+          </a:extLst>
+        </p:spPr>
+      </p:pic>
     </p:spTree>
     <p:extLst>
       <p:ext uri="{BB962C8B-B14F-4D97-AF65-F5344CB8AC3E}">
         <p14:creationId xmlns:p14="http://schemas.microsoft.com/office/powerpoint/2010/main" val="4273181774"/>
+      </p:ext>
+    </p:extLst>
+  </p:cSld>
+  <p:clrMapOvr>
+    <a:masterClrMapping/>
+  </p:clrMapOvr>
+</p:sld>
+</file>
+
+<file path=ppt/slides/slide3.xml><?xml version="1.0" encoding="utf-8"?>
+<p:sld xmlns:a="http://schemas.openxmlformats.org/drawingml/2006/main" xmlns:r="http://schemas.openxmlformats.org/officeDocument/2006/relationships" xmlns:p="http://schemas.openxmlformats.org/presentationml/2006/main">
+  <p:cSld>
+    <p:spTree>
+      <p:nvGrpSpPr>
+        <p:cNvPr id="1" name=""/>
+        <p:cNvGrpSpPr/>
+        <p:nvPr/>
+      </p:nvGrpSpPr>
+      <p:grpSpPr>
+        <a:xfrm>
+          <a:off x="0" y="0"/>
+          <a:ext cx="0" cy="0"/>
+          <a:chOff x="0" y="0"/>
+          <a:chExt cx="0" cy="0"/>
+        </a:xfrm>
+      </p:grpSpPr>
+      <p:sp>
+        <p:nvSpPr>
+          <p:cNvPr id="2" name="Title 1">
+            <a:extLst>
+              <a:ext uri="{FF2B5EF4-FFF2-40B4-BE49-F238E27FC236}">
+                <a16:creationId xmlns:a16="http://schemas.microsoft.com/office/drawing/2014/main" id="{104EAD52-5536-2FD9-5096-284D5483D610}"/>
+              </a:ext>
+            </a:extLst>
+          </p:cNvPr>
+          <p:cNvSpPr>
+            <a:spLocks noGrp="1"/>
+          </p:cNvSpPr>
+          <p:nvPr>
+            <p:ph type="title"/>
+          </p:nvPr>
+        </p:nvSpPr>
+        <p:spPr>
+          <a:xfrm>
+            <a:off x="1098588" y="560824"/>
+            <a:ext cx="9204742" cy="703443"/>
+          </a:xfrm>
+        </p:spPr>
+        <p:txBody>
+          <a:bodyPr/>
+          <a:lstStyle/>
+          <a:p>
+            <a:r>
+              <a:rPr lang="en-GB" dirty="0"/>
+              <a:t>Ground-Truth Annotation Interface</a:t>
+            </a:r>
+          </a:p>
+        </p:txBody>
+      </p:sp>
+      <p:sp>
+        <p:nvSpPr>
+          <p:cNvPr id="4" name="Content Placeholder 2">
+            <a:extLst>
+              <a:ext uri="{FF2B5EF4-FFF2-40B4-BE49-F238E27FC236}">
+                <a16:creationId xmlns:a16="http://schemas.microsoft.com/office/drawing/2014/main" id="{9F66CC04-F702-E2B3-6D51-D6F05E7ACA8F}"/>
+              </a:ext>
+            </a:extLst>
+          </p:cNvPr>
+          <p:cNvSpPr txBox="1">
+            <a:spLocks/>
+          </p:cNvSpPr>
+          <p:nvPr/>
+        </p:nvSpPr>
+        <p:spPr>
+          <a:xfrm>
+            <a:off x="1016942" y="1787979"/>
+            <a:ext cx="9286388" cy="703443"/>
+          </a:xfrm>
+          <a:prstGeom prst="rect">
+            <a:avLst/>
+          </a:prstGeom>
+        </p:spPr>
+        <p:txBody>
+          <a:bodyPr vert="horz" lIns="91440" tIns="45720" rIns="91440" bIns="45720" rtlCol="0">
+            <a:normAutofit/>
+          </a:bodyPr>
+          <a:lstStyle>
+            <a:lvl1pPr marL="182880" indent="-182880" algn="l" defTabSz="914400" rtl="0" eaLnBrk="1" latinLnBrk="0" hangingPunct="1">
+              <a:lnSpc>
+                <a:spcPct val="95000"/>
+              </a:lnSpc>
+              <a:spcBef>
+                <a:spcPts val="1400"/>
+              </a:spcBef>
+              <a:spcAft>
+                <a:spcPts val="200"/>
+              </a:spcAft>
+              <a:buClr>
+                <a:schemeClr val="accent1"/>
+              </a:buClr>
+              <a:buSzPct val="80000"/>
+              <a:buFont typeface="Arial" pitchFamily="34" charset="0"/>
+              <a:buChar char="•"/>
+              <a:defRPr sz="1800" kern="1200" spc="10" baseline="0">
+                <a:solidFill>
+                  <a:schemeClr val="tx1"/>
+                </a:solidFill>
+                <a:latin typeface="+mn-lt"/>
+                <a:ea typeface="+mn-ea"/>
+                <a:cs typeface="+mn-cs"/>
+              </a:defRPr>
+            </a:lvl1pPr>
+            <a:lvl2pPr marL="457200" indent="-182880" algn="l" defTabSz="914400" rtl="0" eaLnBrk="1" latinLnBrk="0" hangingPunct="1">
+              <a:lnSpc>
+                <a:spcPct val="90000"/>
+              </a:lnSpc>
+              <a:spcBef>
+                <a:spcPts val="300"/>
+              </a:spcBef>
+              <a:spcAft>
+                <a:spcPts val="300"/>
+              </a:spcAft>
+              <a:buClr>
+                <a:schemeClr val="accent1"/>
+              </a:buClr>
+              <a:buFont typeface="Wingdings 2" pitchFamily="18" charset="2"/>
+              <a:buChar char=""/>
+              <a:defRPr sz="1600" kern="1200">
+                <a:solidFill>
+                  <a:schemeClr val="tx1">
+                    <a:lumMod val="85000"/>
+                    <a:lumOff val="15000"/>
+                  </a:schemeClr>
+                </a:solidFill>
+                <a:latin typeface="+mn-lt"/>
+                <a:ea typeface="+mn-ea"/>
+                <a:cs typeface="+mn-cs"/>
+              </a:defRPr>
+            </a:lvl2pPr>
+            <a:lvl3pPr marL="731520" indent="-182880" algn="l" defTabSz="914400" rtl="0" eaLnBrk="1" latinLnBrk="0" hangingPunct="1">
+              <a:lnSpc>
+                <a:spcPct val="90000"/>
+              </a:lnSpc>
+              <a:spcBef>
+                <a:spcPts val="300"/>
+              </a:spcBef>
+              <a:spcAft>
+                <a:spcPts val="300"/>
+              </a:spcAft>
+              <a:buClr>
+                <a:schemeClr val="accent1"/>
+              </a:buClr>
+              <a:buFont typeface="Wingdings 2" pitchFamily="18" charset="2"/>
+              <a:buChar char=""/>
+              <a:defRPr sz="1400" kern="1200">
+                <a:solidFill>
+                  <a:schemeClr val="tx1">
+                    <a:lumMod val="85000"/>
+                    <a:lumOff val="15000"/>
+                  </a:schemeClr>
+                </a:solidFill>
+                <a:latin typeface="+mn-lt"/>
+                <a:ea typeface="+mn-ea"/>
+                <a:cs typeface="+mn-cs"/>
+              </a:defRPr>
+            </a:lvl3pPr>
+            <a:lvl4pPr marL="1005840" indent="-182880" algn="l" defTabSz="914400" rtl="0" eaLnBrk="1" latinLnBrk="0" hangingPunct="1">
+              <a:lnSpc>
+                <a:spcPct val="90000"/>
+              </a:lnSpc>
+              <a:spcBef>
+                <a:spcPts val="300"/>
+              </a:spcBef>
+              <a:spcAft>
+                <a:spcPts val="300"/>
+              </a:spcAft>
+              <a:buClr>
+                <a:schemeClr val="accent1"/>
+              </a:buClr>
+              <a:buFont typeface="Wingdings 2" pitchFamily="18" charset="2"/>
+              <a:buChar char=""/>
+              <a:defRPr sz="1400" kern="1200">
+                <a:solidFill>
+                  <a:schemeClr val="tx1">
+                    <a:lumMod val="85000"/>
+                    <a:lumOff val="15000"/>
+                  </a:schemeClr>
+                </a:solidFill>
+                <a:latin typeface="+mn-lt"/>
+                <a:ea typeface="+mn-ea"/>
+                <a:cs typeface="+mn-cs"/>
+              </a:defRPr>
+            </a:lvl4pPr>
+            <a:lvl5pPr marL="1280160" indent="-182880" algn="l" defTabSz="914400" rtl="0" eaLnBrk="1" latinLnBrk="0" hangingPunct="1">
+              <a:lnSpc>
+                <a:spcPct val="90000"/>
+              </a:lnSpc>
+              <a:spcBef>
+                <a:spcPts val="300"/>
+              </a:spcBef>
+              <a:spcAft>
+                <a:spcPts val="300"/>
+              </a:spcAft>
+              <a:buClr>
+                <a:schemeClr val="accent1"/>
+              </a:buClr>
+              <a:buFont typeface="Wingdings 2" pitchFamily="18" charset="2"/>
+              <a:buChar char=""/>
+              <a:defRPr sz="1400" kern="1200">
+                <a:solidFill>
+                  <a:schemeClr val="tx1">
+                    <a:lumMod val="85000"/>
+                    <a:lumOff val="15000"/>
+                  </a:schemeClr>
+                </a:solidFill>
+                <a:latin typeface="+mn-lt"/>
+                <a:ea typeface="+mn-ea"/>
+                <a:cs typeface="+mn-cs"/>
+              </a:defRPr>
+            </a:lvl5pPr>
+            <a:lvl6pPr marL="1600000" indent="-228600" algn="l" defTabSz="914400" rtl="0" eaLnBrk="1" latinLnBrk="0" hangingPunct="1">
+              <a:lnSpc>
+                <a:spcPct val="90000"/>
+              </a:lnSpc>
+              <a:spcBef>
+                <a:spcPts val="300"/>
+              </a:spcBef>
+              <a:spcAft>
+                <a:spcPts val="300"/>
+              </a:spcAft>
+              <a:buClr>
+                <a:schemeClr val="accent1"/>
+              </a:buClr>
+              <a:buFont typeface="Wingdings 2" pitchFamily="18" charset="2"/>
+              <a:buChar char=""/>
+              <a:defRPr sz="1400" kern="1200">
+                <a:solidFill>
+                  <a:schemeClr val="tx1">
+                    <a:lumMod val="85000"/>
+                    <a:lumOff val="15000"/>
+                  </a:schemeClr>
+                </a:solidFill>
+                <a:latin typeface="+mn-lt"/>
+                <a:ea typeface="+mn-ea"/>
+                <a:cs typeface="+mn-cs"/>
+              </a:defRPr>
+            </a:lvl6pPr>
+            <a:lvl7pPr marL="1900000" indent="-228600" algn="l" defTabSz="914400" rtl="0" eaLnBrk="1" latinLnBrk="0" hangingPunct="1">
+              <a:lnSpc>
+                <a:spcPct val="90000"/>
+              </a:lnSpc>
+              <a:spcBef>
+                <a:spcPts val="300"/>
+              </a:spcBef>
+              <a:spcAft>
+                <a:spcPts val="300"/>
+              </a:spcAft>
+              <a:buClr>
+                <a:schemeClr val="accent1"/>
+              </a:buClr>
+              <a:buFont typeface="Wingdings 2" pitchFamily="18" charset="2"/>
+              <a:buChar char=""/>
+              <a:defRPr sz="1400" kern="1200">
+                <a:solidFill>
+                  <a:schemeClr val="tx1">
+                    <a:lumMod val="85000"/>
+                    <a:lumOff val="15000"/>
+                  </a:schemeClr>
+                </a:solidFill>
+                <a:latin typeface="+mn-lt"/>
+                <a:ea typeface="+mn-ea"/>
+                <a:cs typeface="+mn-cs"/>
+              </a:defRPr>
+            </a:lvl7pPr>
+            <a:lvl8pPr marL="2200000" indent="-228600" algn="l" defTabSz="914400" rtl="0" eaLnBrk="1" latinLnBrk="0" hangingPunct="1">
+              <a:lnSpc>
+                <a:spcPct val="90000"/>
+              </a:lnSpc>
+              <a:spcBef>
+                <a:spcPts val="300"/>
+              </a:spcBef>
+              <a:spcAft>
+                <a:spcPts val="300"/>
+              </a:spcAft>
+              <a:buClr>
+                <a:schemeClr val="accent1"/>
+              </a:buClr>
+              <a:buFont typeface="Wingdings 2" pitchFamily="18" charset="2"/>
+              <a:buChar char=""/>
+              <a:defRPr sz="1400" kern="1200">
+                <a:solidFill>
+                  <a:schemeClr val="tx1">
+                    <a:lumMod val="85000"/>
+                    <a:lumOff val="15000"/>
+                  </a:schemeClr>
+                </a:solidFill>
+                <a:latin typeface="+mn-lt"/>
+                <a:ea typeface="+mn-ea"/>
+                <a:cs typeface="+mn-cs"/>
+              </a:defRPr>
+            </a:lvl8pPr>
+            <a:lvl9pPr marL="2500000" indent="-228600" algn="l" defTabSz="914400" rtl="0" eaLnBrk="1" latinLnBrk="0" hangingPunct="1">
+              <a:lnSpc>
+                <a:spcPct val="90000"/>
+              </a:lnSpc>
+              <a:spcBef>
+                <a:spcPts val="300"/>
+              </a:spcBef>
+              <a:spcAft>
+                <a:spcPts val="300"/>
+              </a:spcAft>
+              <a:buClr>
+                <a:schemeClr val="accent1"/>
+              </a:buClr>
+              <a:buFont typeface="Wingdings 2" pitchFamily="18" charset="2"/>
+              <a:buChar char=""/>
+              <a:defRPr sz="1400" kern="1200">
+                <a:solidFill>
+                  <a:schemeClr val="tx1">
+                    <a:lumMod val="85000"/>
+                    <a:lumOff val="15000"/>
+                  </a:schemeClr>
+                </a:solidFill>
+                <a:latin typeface="+mn-lt"/>
+                <a:ea typeface="+mn-ea"/>
+                <a:cs typeface="+mn-cs"/>
+              </a:defRPr>
+            </a:lvl9pPr>
+          </a:lstStyle>
+          <a:p>
+            <a:pPr marL="274320" lvl="1" indent="0" algn="ctr">
+              <a:buFont typeface="Wingdings 2" pitchFamily="18" charset="2"/>
+              <a:buNone/>
+            </a:pPr>
+            <a:r>
+              <a:rPr lang="en-GB" sz="2000" b="1" dirty="0">
+                <a:solidFill>
+                  <a:srgbClr val="00359E"/>
+                </a:solidFill>
+              </a:rPr>
+              <a:t>Interface to streamline the creation of test collections for quantitative evaluations of automatic videography systems.</a:t>
+            </a:r>
+          </a:p>
+          <a:p>
+            <a:pPr marL="274320" lvl="1" indent="0" algn="ctr">
+              <a:buFont typeface="Wingdings 2" pitchFamily="18" charset="2"/>
+              <a:buNone/>
+            </a:pPr>
+            <a:endParaRPr lang="en-GB" b="1" dirty="0">
+              <a:solidFill>
+                <a:srgbClr val="00359E"/>
+              </a:solidFill>
+            </a:endParaRPr>
+          </a:p>
+          <a:p>
+            <a:pPr marL="274320" lvl="1" indent="0">
+              <a:buFont typeface="Wingdings 2" pitchFamily="18" charset="2"/>
+              <a:buNone/>
+            </a:pPr>
+            <a:endParaRPr lang="en-GB" b="1" dirty="0">
+              <a:solidFill>
+                <a:srgbClr val="00359E"/>
+              </a:solidFill>
+            </a:endParaRPr>
+          </a:p>
+        </p:txBody>
+      </p:sp>
+      <p:sp>
+        <p:nvSpPr>
+          <p:cNvPr id="5" name="TextBox 4">
+            <a:extLst>
+              <a:ext uri="{FF2B5EF4-FFF2-40B4-BE49-F238E27FC236}">
+                <a16:creationId xmlns:a16="http://schemas.microsoft.com/office/drawing/2014/main" id="{3133B39E-76B8-3A0F-CC3F-D9F3CEE5412F}"/>
+              </a:ext>
+            </a:extLst>
+          </p:cNvPr>
+          <p:cNvSpPr txBox="1"/>
+          <p:nvPr/>
+        </p:nvSpPr>
+        <p:spPr>
+          <a:xfrm>
+            <a:off x="1163902" y="3302954"/>
+            <a:ext cx="8821019" cy="2462213"/>
+          </a:xfrm>
+          <a:prstGeom prst="rect">
+            <a:avLst/>
+          </a:prstGeom>
+          <a:noFill/>
+        </p:spPr>
+        <p:txBody>
+          <a:bodyPr wrap="square" rtlCol="0">
+            <a:spAutoFit/>
+          </a:bodyPr>
+          <a:lstStyle/>
+          <a:p>
+            <a:r>
+              <a:rPr lang="en-GB" b="1" dirty="0"/>
+              <a:t>Motivations:</a:t>
+            </a:r>
+          </a:p>
+          <a:p>
+            <a:pPr marL="285750" indent="-285750">
+              <a:lnSpc>
+                <a:spcPct val="200000"/>
+              </a:lnSpc>
+              <a:buFont typeface="Arial" panose="020B0604020202020204" pitchFamily="34" charset="0"/>
+              <a:buChar char="•"/>
+            </a:pPr>
+            <a:r>
+              <a:rPr lang="en-GB" dirty="0"/>
+              <a:t>Eliminate need for qualitative user evaluations.</a:t>
+            </a:r>
+          </a:p>
+          <a:p>
+            <a:pPr marL="742950" lvl="1" indent="-285750">
+              <a:buClr>
+                <a:schemeClr val="tx1"/>
+              </a:buClr>
+              <a:buFont typeface="Wingdings" panose="05000000000000000000" pitchFamily="2" charset="2"/>
+              <a:buChar char="§"/>
+            </a:pPr>
+            <a:r>
+              <a:rPr lang="en-GB" sz="1600" dirty="0">
+                <a:solidFill>
+                  <a:schemeClr val="accent2"/>
+                </a:solidFill>
+              </a:rPr>
+              <a:t>Biased and unreproducible</a:t>
+            </a:r>
+          </a:p>
+          <a:p>
+            <a:pPr marL="742950" lvl="1" indent="-285750">
+              <a:buClr>
+                <a:schemeClr val="tx1"/>
+              </a:buClr>
+              <a:buFont typeface="Wingdings" panose="05000000000000000000" pitchFamily="2" charset="2"/>
+              <a:buChar char="§"/>
+            </a:pPr>
+            <a:r>
+              <a:rPr lang="en-GB" sz="1600" dirty="0">
+                <a:solidFill>
+                  <a:schemeClr val="accent2"/>
+                </a:solidFill>
+              </a:rPr>
+              <a:t>Time-consuming</a:t>
+            </a:r>
+          </a:p>
+          <a:p>
+            <a:pPr marL="742950" lvl="1" indent="-285750">
+              <a:buClr>
+                <a:schemeClr val="tx1"/>
+              </a:buClr>
+              <a:buFont typeface="Wingdings" panose="05000000000000000000" pitchFamily="2" charset="2"/>
+              <a:buChar char="§"/>
+            </a:pPr>
+            <a:r>
+              <a:rPr lang="en-GB" sz="1600" dirty="0">
+                <a:solidFill>
+                  <a:schemeClr val="accent2"/>
+                </a:solidFill>
+              </a:rPr>
+              <a:t>Impossible to fairly compare different systems</a:t>
+            </a:r>
+          </a:p>
+          <a:p>
+            <a:pPr lvl="1">
+              <a:buClr>
+                <a:schemeClr val="tx1"/>
+              </a:buClr>
+            </a:pPr>
+            <a:endParaRPr lang="en-GB" sz="1000" dirty="0">
+              <a:solidFill>
+                <a:schemeClr val="accent2"/>
+              </a:solidFill>
+            </a:endParaRPr>
+          </a:p>
+          <a:p>
+            <a:pPr marL="285750" indent="-285750">
+              <a:buFont typeface="Arial" panose="020B0604020202020204" pitchFamily="34" charset="0"/>
+              <a:buChar char="•"/>
+            </a:pPr>
+            <a:r>
+              <a:rPr lang="en-GB" dirty="0"/>
+              <a:t>Lack of existing procedures that address relevance assessment for automatic videography systems.</a:t>
+            </a:r>
+          </a:p>
+        </p:txBody>
+      </p:sp>
+    </p:spTree>
+    <p:extLst>
+      <p:ext uri="{BB962C8B-B14F-4D97-AF65-F5344CB8AC3E}">
+        <p14:creationId xmlns:p14="http://schemas.microsoft.com/office/powerpoint/2010/main" val="850027439"/>
       </p:ext>
     </p:extLst>
   </p:cSld>

</xml_diff>

<commit_message>
Added ECIR paper to conclusion
</commit_message>
<xml_diff>
--- a/presentation/presentation_slides.pptx
+++ b/presentation/presentation_slides.pptx
@@ -282,7 +282,7 @@
           <a:p>
             <a:fld id="{763604D9-471B-4D04-91EE-DF22DC530484}" type="datetimeFigureOut">
               <a:rPr lang="en-GB" smtClean="0"/>
-              <a:t>23/03/2023</a:t>
+              <a:t>24/03/2023</a:t>
             </a:fld>
             <a:endParaRPr lang="en-GB"/>
           </a:p>
@@ -510,7 +510,7 @@
           <a:p>
             <a:fld id="{763604D9-471B-4D04-91EE-DF22DC530484}" type="datetimeFigureOut">
               <a:rPr lang="en-GB" smtClean="0"/>
-              <a:t>23/03/2023</a:t>
+              <a:t>24/03/2023</a:t>
             </a:fld>
             <a:endParaRPr lang="en-GB"/>
           </a:p>
@@ -690,7 +690,7 @@
           <a:p>
             <a:fld id="{763604D9-471B-4D04-91EE-DF22DC530484}" type="datetimeFigureOut">
               <a:rPr lang="en-GB" smtClean="0"/>
-              <a:t>23/03/2023</a:t>
+              <a:t>24/03/2023</a:t>
             </a:fld>
             <a:endParaRPr lang="en-GB"/>
           </a:p>
@@ -860,7 +860,7 @@
           <a:p>
             <a:fld id="{763604D9-471B-4D04-91EE-DF22DC530484}" type="datetimeFigureOut">
               <a:rPr lang="en-GB" smtClean="0"/>
-              <a:t>23/03/2023</a:t>
+              <a:t>24/03/2023</a:t>
             </a:fld>
             <a:endParaRPr lang="en-GB"/>
           </a:p>
@@ -1114,7 +1114,7 @@
           <a:p>
             <a:fld id="{763604D9-471B-4D04-91EE-DF22DC530484}" type="datetimeFigureOut">
               <a:rPr lang="en-GB" smtClean="0"/>
-              <a:t>23/03/2023</a:t>
+              <a:t>24/03/2023</a:t>
             </a:fld>
             <a:endParaRPr lang="en-GB"/>
           </a:p>
@@ -1440,7 +1440,7 @@
           <a:p>
             <a:fld id="{763604D9-471B-4D04-91EE-DF22DC530484}" type="datetimeFigureOut">
               <a:rPr lang="en-GB" smtClean="0"/>
-              <a:t>23/03/2023</a:t>
+              <a:t>24/03/2023</a:t>
             </a:fld>
             <a:endParaRPr lang="en-GB"/>
           </a:p>
@@ -1891,7 +1891,7 @@
           <a:p>
             <a:fld id="{763604D9-471B-4D04-91EE-DF22DC530484}" type="datetimeFigureOut">
               <a:rPr lang="en-GB" smtClean="0"/>
-              <a:t>23/03/2023</a:t>
+              <a:t>24/03/2023</a:t>
             </a:fld>
             <a:endParaRPr lang="en-GB"/>
           </a:p>
@@ -2009,7 +2009,7 @@
           <a:p>
             <a:fld id="{763604D9-471B-4D04-91EE-DF22DC530484}" type="datetimeFigureOut">
               <a:rPr lang="en-GB" smtClean="0"/>
-              <a:t>23/03/2023</a:t>
+              <a:t>24/03/2023</a:t>
             </a:fld>
             <a:endParaRPr lang="en-GB"/>
           </a:p>
@@ -2104,7 +2104,7 @@
           <a:p>
             <a:fld id="{763604D9-471B-4D04-91EE-DF22DC530484}" type="datetimeFigureOut">
               <a:rPr lang="en-GB" smtClean="0"/>
-              <a:t>23/03/2023</a:t>
+              <a:t>24/03/2023</a:t>
             </a:fld>
             <a:endParaRPr lang="en-GB"/>
           </a:p>
@@ -2391,7 +2391,7 @@
           <a:p>
             <a:fld id="{763604D9-471B-4D04-91EE-DF22DC530484}" type="datetimeFigureOut">
               <a:rPr lang="en-GB" smtClean="0"/>
-              <a:t>23/03/2023</a:t>
+              <a:t>24/03/2023</a:t>
             </a:fld>
             <a:endParaRPr lang="en-GB"/>
           </a:p>
@@ -2713,7 +2713,7 @@
           <a:p>
             <a:fld id="{763604D9-471B-4D04-91EE-DF22DC530484}" type="datetimeFigureOut">
               <a:rPr lang="en-GB" smtClean="0"/>
-              <a:t>23/03/2023</a:t>
+              <a:t>24/03/2023</a:t>
             </a:fld>
             <a:endParaRPr lang="en-GB"/>
           </a:p>
@@ -2967,7 +2967,7 @@
           <a:p>
             <a:fld id="{763604D9-471B-4D04-91EE-DF22DC530484}" type="datetimeFigureOut">
               <a:rPr lang="en-GB" smtClean="0"/>
-              <a:t>23/03/2023</a:t>
+              <a:t>24/03/2023</a:t>
             </a:fld>
             <a:endParaRPr lang="en-GB"/>
           </a:p>

</xml_diff>